<commit_message>
Remove TODO slide from presentation
</commit_message>
<xml_diff>
--- a/presentation/2.lifting-state-up.pptx
+++ b/presentation/2.lifting-state-up.pptx
@@ -5,10 +5,10 @@
     <p:sldMasterId id="2147483648" r:id="rId17"/>
   </p:sldMasterIdLst>
   <p:notesMasterIdLst>
-    <p:notesMasterId r:id="rId25"/>
+    <p:notesMasterId r:id="rId24"/>
   </p:notesMasterIdLst>
   <p:handoutMasterIdLst>
-    <p:handoutMasterId r:id="rId26"/>
+    <p:handoutMasterId r:id="rId25"/>
   </p:handoutMasterIdLst>
   <p:sldIdLst>
     <p:sldId id="256" r:id="rId18"/>
@@ -17,24 +17,23 @@
     <p:sldId id="260" r:id="rId21"/>
     <p:sldId id="261" r:id="rId22"/>
     <p:sldId id="262" r:id="rId23"/>
-    <p:sldId id="263" r:id="rId24"/>
   </p:sldIdLst>
   <p:sldSz cx="12192000" cy="6858000"/>
   <p:notesSz cx="6858000" cy="9144000"/>
   <p:embeddedFontLst>
     <p:embeddedFont>
       <p:font typeface="AA Zuehlke" panose="02000503060000020004" pitchFamily="2" charset="0"/>
-      <p:regular r:id="rId27"/>
-      <p:italic r:id="rId28"/>
+      <p:regular r:id="rId26"/>
+      <p:italic r:id="rId27"/>
     </p:embeddedFont>
     <p:embeddedFont>
       <p:font typeface="AA Zuehlke Medium" panose="02000603060000020004" pitchFamily="2" charset="0"/>
-      <p:regular r:id="rId29"/>
-      <p:italic r:id="rId30"/>
+      <p:regular r:id="rId28"/>
+      <p:italic r:id="rId29"/>
     </p:embeddedFont>
   </p:embeddedFontLst>
   <p:custDataLst>
-    <p:tags r:id="rId31"/>
+    <p:tags r:id="rId30"/>
   </p:custDataLst>
   <p:defaultTextStyle>
     <a:defPPr>
@@ -239,7 +238,7 @@
               <a:rPr lang="en-GB" smtClean="0">
                 <a:latin typeface="AA Zuehlke" pitchFamily="2" charset="0"/>
               </a:rPr>
-              <a:t>26/08/2019</a:t>
+              <a:t>22/11/2019</a:t>
             </a:fld>
             <a:endParaRPr lang="en-GB">
               <a:latin typeface="AA Zuehlke" pitchFamily="2" charset="0"/>
@@ -423,7 +422,7 @@
             <a:fld id="{A6966AE6-B72D-4967-9CA3-8469D2863705}" type="datetimeFigureOut">
               <a:rPr lang="en-GB" noProof="0" smtClean="0"/>
               <a:pPr/>
-              <a:t>26/08/2019</a:t>
+              <a:t>22/11/2019</a:t>
             </a:fld>
             <a:endParaRPr lang="en-GB" noProof="0"/>
           </a:p>
@@ -16823,134 +16822,6 @@
 </p:sld>
 </file>
 
-<file path=ppt/slides/slide7.xml><?xml version="1.0" encoding="utf-8"?>
-<p:sld xmlns:a="http://schemas.openxmlformats.org/drawingml/2006/main" xmlns:r="http://schemas.openxmlformats.org/officeDocument/2006/relationships" xmlns:p="http://schemas.openxmlformats.org/presentationml/2006/main">
-  <p:cSld>
-    <p:spTree>
-      <p:nvGrpSpPr>
-        <p:cNvPr id="1" name=""/>
-        <p:cNvGrpSpPr/>
-        <p:nvPr/>
-      </p:nvGrpSpPr>
-      <p:grpSpPr>
-        <a:xfrm>
-          <a:off x="0" y="0"/>
-          <a:ext cx="0" cy="0"/>
-          <a:chOff x="0" y="0"/>
-          <a:chExt cx="0" cy="0"/>
-        </a:xfrm>
-      </p:grpSpPr>
-      <p:sp>
-        <p:nvSpPr>
-          <p:cNvPr id="6" name="Text Placeholder 5">
-            <a:extLst>
-              <a:ext uri="{FF2B5EF4-FFF2-40B4-BE49-F238E27FC236}">
-                <a16:creationId xmlns:a16="http://schemas.microsoft.com/office/drawing/2014/main" id="{CECD4634-81A3-43C1-B494-274F84E1098E}"/>
-              </a:ext>
-            </a:extLst>
-          </p:cNvPr>
-          <p:cNvSpPr>
-            <a:spLocks noGrp="1"/>
-          </p:cNvSpPr>
-          <p:nvPr>
-            <p:ph type="body" sz="quarter" idx="13"/>
-          </p:nvPr>
-        </p:nvSpPr>
-        <p:spPr/>
-        <p:txBody>
-          <a:bodyPr/>
-          <a:lstStyle/>
-          <a:p>
-            <a:endParaRPr lang="en-GB"/>
-          </a:p>
-        </p:txBody>
-      </p:sp>
-      <p:sp>
-        <p:nvSpPr>
-          <p:cNvPr id="5" name="Title 4">
-            <a:extLst>
-              <a:ext uri="{FF2B5EF4-FFF2-40B4-BE49-F238E27FC236}">
-                <a16:creationId xmlns:a16="http://schemas.microsoft.com/office/drawing/2014/main" id="{3371C040-155A-463D-A84A-60400FE8299B}"/>
-              </a:ext>
-            </a:extLst>
-          </p:cNvPr>
-          <p:cNvSpPr>
-            <a:spLocks noGrp="1"/>
-          </p:cNvSpPr>
-          <p:nvPr>
-            <p:ph type="title"/>
-          </p:nvPr>
-        </p:nvSpPr>
-        <p:spPr/>
-        <p:txBody>
-          <a:bodyPr/>
-          <a:lstStyle/>
-          <a:p>
-            <a:r>
-              <a:rPr lang="en-GB" dirty="0">
-                <a:solidFill>
-                  <a:srgbClr val="FF9900"/>
-                </a:solidFill>
-              </a:rPr>
-              <a:t>Lifting state up</a:t>
-            </a:r>
-          </a:p>
-        </p:txBody>
-      </p:sp>
-      <p:sp>
-        <p:nvSpPr>
-          <p:cNvPr id="7" name="Content Placeholder 6">
-            <a:extLst>
-              <a:ext uri="{FF2B5EF4-FFF2-40B4-BE49-F238E27FC236}">
-                <a16:creationId xmlns:a16="http://schemas.microsoft.com/office/drawing/2014/main" id="{F62B43E6-4802-4026-BB94-1F83A1BA6CCA}"/>
-              </a:ext>
-            </a:extLst>
-          </p:cNvPr>
-          <p:cNvSpPr>
-            <a:spLocks noGrp="1"/>
-          </p:cNvSpPr>
-          <p:nvPr>
-            <p:ph sz="quarter" idx="4294967295"/>
-          </p:nvPr>
-        </p:nvSpPr>
-        <p:spPr>
-          <a:xfrm>
-            <a:off x="406398" y="1789354"/>
-            <a:ext cx="11379200" cy="4662246"/>
-          </a:xfrm>
-        </p:spPr>
-        <p:txBody>
-          <a:bodyPr/>
-          <a:lstStyle/>
-          <a:p>
-            <a:r>
-              <a:rPr lang="en-GB" dirty="0"/>
-              <a:t>TODO: example of data flow</a:t>
-            </a:r>
-          </a:p>
-          <a:p>
-            <a:endParaRPr lang="en-GB" dirty="0"/>
-          </a:p>
-        </p:txBody>
-      </p:sp>
-    </p:spTree>
-    <p:custDataLst>
-      <p:custData r:id="rId1"/>
-      <p:custData r:id="rId2"/>
-      <p:tags r:id="rId3"/>
-    </p:custDataLst>
-    <p:extLst>
-      <p:ext uri="{BB962C8B-B14F-4D97-AF65-F5344CB8AC3E}">
-        <p14:creationId xmlns:p14="http://schemas.microsoft.com/office/powerpoint/2010/main" val="1211497140"/>
-      </p:ext>
-    </p:extLst>
-  </p:cSld>
-  <p:clrMapOvr>
-    <a:masterClrMapping/>
-  </p:clrMapOvr>
-</p:sld>
-</file>
-
 <file path=ppt/tags/tag1.xml><?xml version="1.0" encoding="utf-8"?>
 <p:tagLst xmlns:a="http://schemas.openxmlformats.org/drawingml/2006/main" xmlns:r="http://schemas.openxmlformats.org/officeDocument/2006/relationships" xmlns:p="http://schemas.openxmlformats.org/presentationml/2006/main">
   <p:tag name="VERSINFO" val="ZE2202"/>
@@ -17020,12 +16891,6 @@
 <file path=ppt/tags/tag2.xml><?xml version="1.0" encoding="utf-8"?>
 <p:tagLst xmlns:a="http://schemas.openxmlformats.org/drawingml/2006/main" xmlns:r="http://schemas.openxmlformats.org/officeDocument/2006/relationships" xmlns:p="http://schemas.openxmlformats.org/presentationml/2006/main">
   <p:tag name="SHAPETYPE" val="Copyright"/>
-</p:tagLst>
-</file>
-
-<file path=ppt/tags/tag20.xml><?xml version="1.0" encoding="utf-8"?>
-<p:tagLst xmlns:a="http://schemas.openxmlformats.org/drawingml/2006/main" xmlns:r="http://schemas.openxmlformats.org/officeDocument/2006/relationships" xmlns:p="http://schemas.openxmlformats.org/presentationml/2006/main">
-  <p:tag name="TEMPLAFYSLIDEID" val="636693228413277011"/>
 </p:tagLst>
 </file>
 
@@ -17868,7 +17733,7 @@
 </file>
 
 <file path=customXml/item1.xml><?xml version="1.0" encoding="utf-8"?>
-<TemplafySlideFormConfiguration><![CDATA[{"formFields":[],"formDataEntries":[]}]]></TemplafySlideFormConfiguration>
+<TemplafySlideTemplateConfiguration><![CDATA[{"elementsMetadata":[],"documentContentValidatorConfiguration":{"enableDocumentContentValidator":false,"documentContentValidatorVersion":0},"slideId":"636746835488477258","enableDocumentContentUpdater":true,"version":"1.0"}]]></TemplafySlideTemplateConfiguration>
 </file>
 
 <file path=customXml/item10.xml><?xml version="1.0" encoding="utf-8"?>
@@ -17880,7 +17745,7 @@
 </file>
 
 <file path=customXml/item12.xml><?xml version="1.0" encoding="utf-8"?>
-<TemplafySlideFormConfiguration><![CDATA[{"formFields":[],"formDataEntries":[]}]]></TemplafySlideFormConfiguration>
+<TemplafyFormConfiguration><![CDATA[{"formFields":[{"required":true,"type":"datePicker","name":"Date","label":"Date","helpTexts":{"prefix":"","postfix":""},"spacing":{},"fullyQualifiedName":"Date"},{"dataSource":"PrivacyInformation","displayColumn":"privacyInformation","hideIfNoUserInteractionRequired":false,"distinct":true,"filter":{"column":"iana","otherFieldName":"Language","fullyQualifiedOtherFieldName":"Language","otherFieldColumn":"iana","formReference":"userProfile","operator":"equals"},"required":false,"autoSelectFirstOption":false,"type":"dropDown","name":"Privacy_Information","label":"Privacy","helpTexts":{"prefix":"","postfix":""},"spacing":{},"fullyQualifiedName":"Privacy_Information"},{"required":true,"placeholder":"","lines":0,"type":"textBox","name":"PresentationTitle","label":"Presentation Title","helpTexts":{"prefix":"","postfix":""},"spacing":{},"fullyQualifiedName":"PresentationTitle"}],"formDataEntries":[{"name":"Date","value":"Le5iQ2jK67uNHqr6heTYNw=="},{"name":"PresentationTitle","value":"d+T2Rt+RkaRwuAkZUjMifNOqEssHcfLwg6jE3Easmjw="}]}]]></TemplafyFormConfiguration>
 </file>
 
 <file path=customXml/item13.xml><?xml version="1.0" encoding="utf-8"?>
@@ -17900,19 +17765,19 @@
 </file>
 
 <file path=customXml/item2.xml><?xml version="1.0" encoding="utf-8"?>
+<TemplafySlideFormConfiguration><![CDATA[{"formFields":[],"formDataEntries":[]}]]></TemplafySlideFormConfiguration>
+</file>
+
+<file path=customXml/item3.xml><?xml version="1.0" encoding="utf-8"?>
+<TemplafySlideFormConfiguration><![CDATA[{"formFields":[],"formDataEntries":[]}]]></TemplafySlideFormConfiguration>
+</file>
+
+<file path=customXml/item4.xml><?xml version="1.0" encoding="utf-8"?>
 <TemplafyTemplateConfiguration><![CDATA[{"elementsMetadata":[{"type":"shape","id":"1983520e-3abb-46c3-8350-16ba74dbd2f5","elementConfiguration":{"binding":"UserProfile.Name","disableUpdates":false,"type":"text"}},{"type":"shape","id":"45c190a0-50e1-43ca-8fec-1f112e9ace99","elementConfiguration":{"binding":"Form.PresentationTitle","disableUpdates":false,"type":"text"}},{"type":"shape","id":"69a5678c-6212-4ca9-9da0-ee6815b77c93","elementConfiguration":{"binding":"Form.Date","disableUpdates":false,"type":"date"}},{"type":"shape","id":"98b5d2e8-ab4f-4d4c-89aa-473388d524cc","elementConfiguration":{"binding":"Form.Privacy_Information.PrivacyInformation","disableUpdates":false,"type":"text"}},{"type":"shape","id":"0f2972e9-142c-4def-92fe-797ab4975432","elementConfiguration":{"binding":"UserProfile.OFFICE.Company-spelling","disableUpdates":false,"type":"text"}},{"type":"shape","id":"847c8706-e74e-492c-bfbc-e5c4e6458979","elementConfiguration":{"binding":"Form.Date","format":"{{DateFormats.CustomD}}","disableUpdates":false,"type":"date"}}],"transformationConfigurations":[],"templateName":"Empty Zuehlke Template - EN","templateDescription":"Empty presentation 16:9 format EN-UK ","enableDocumentContentUpdater":true,"version":"1.0"}]]></TemplafyTemplateConfiguration>
 </file>
 
-<file path=customXml/item3.xml><?xml version="1.0" encoding="utf-8"?>
-<TemplafySlideTemplateConfiguration><![CDATA[{"elementsMetadata":[],"documentContentValidatorConfiguration":{"enableDocumentContentValidator":false,"documentContentValidatorVersion":0},"slideId":"636746835488477258","enableDocumentContentUpdater":true,"version":"1.0"}]]></TemplafySlideTemplateConfiguration>
-</file>
-
-<file path=customXml/item4.xml><?xml version="1.0" encoding="utf-8"?>
-<TemplafyFormConfiguration><![CDATA[{"formFields":[{"required":true,"type":"datePicker","name":"Date","label":"Date","helpTexts":{"prefix":"","postfix":""},"spacing":{},"fullyQualifiedName":"Date"},{"dataSource":"PrivacyInformation","displayColumn":"privacyInformation","hideIfNoUserInteractionRequired":false,"distinct":true,"filter":{"column":"iana","otherFieldName":"Language","fullyQualifiedOtherFieldName":"Language","otherFieldColumn":"iana","formReference":"userProfile","operator":"equals"},"required":false,"autoSelectFirstOption":false,"type":"dropDown","name":"Privacy_Information","label":"Privacy","helpTexts":{"prefix":"","postfix":""},"spacing":{},"fullyQualifiedName":"Privacy_Information"},{"required":true,"placeholder":"","lines":0,"type":"textBox","name":"PresentationTitle","label":"Presentation Title","helpTexts":{"prefix":"","postfix":""},"spacing":{},"fullyQualifiedName":"PresentationTitle"}],"formDataEntries":[{"name":"Date","value":"Le5iQ2jK67uNHqr6heTYNw=="},{"name":"PresentationTitle","value":"d+T2Rt+RkaRwuAkZUjMifNOqEssHcfLwg6jE3Easmjw="}]}]]></TemplafyFormConfiguration>
-</file>
-
 <file path=customXml/item5.xml><?xml version="1.0" encoding="utf-8"?>
-<TemplafySlideTemplateConfiguration><![CDATA[{"elementsMetadata":[],"documentContentValidatorConfiguration":{"enableDocumentContentValidator":false,"documentContentValidatorVersion":0},"slideId":"636746835489847964","enableDocumentContentUpdater":true,"version":"1.0"}]]></TemplafySlideTemplateConfiguration>
+<TemplafySlideFormConfiguration><![CDATA[{"formFields":[],"formDataEntries":[]}]]></TemplafySlideFormConfiguration>
 </file>
 
 <file path=customXml/item6.xml><?xml version="1.0" encoding="utf-8"?>
@@ -17928,35 +17793,35 @@
 </file>
 
 <file path=customXml/item9.xml><?xml version="1.0" encoding="utf-8"?>
-<TemplafySlideFormConfiguration><![CDATA[{"formFields":[],"formDataEntries":[]}]]></TemplafySlideFormConfiguration>
+<TemplafySlideTemplateConfiguration><![CDATA[{"elementsMetadata":[],"documentContentValidatorConfiguration":{"enableDocumentContentValidator":false,"documentContentValidatorVersion":0},"slideId":"636746835489847964","enableDocumentContentUpdater":true,"version":"1.0"}]]></TemplafySlideTemplateConfiguration>
 </file>
 
 <file path=customXml/itemProps1.xml><?xml version="1.0" encoding="utf-8"?>
-<ds:datastoreItem xmlns:ds="http://schemas.openxmlformats.org/officeDocument/2006/customXml" ds:itemID="{067CD289-AAE9-47C2-A22E-4A438035E00B}">
+<ds:datastoreItem xmlns:ds="http://schemas.openxmlformats.org/officeDocument/2006/customXml" ds:itemID="{842D172F-72A1-4859-BC77-2CA436BA65BB}">
   <ds:schemaRefs/>
 </ds:datastoreItem>
 </file>
 
 <file path=customXml/itemProps10.xml><?xml version="1.0" encoding="utf-8"?>
+<ds:datastoreItem xmlns:ds="http://schemas.openxmlformats.org/officeDocument/2006/customXml" ds:itemID="{E0C4D9C2-E20F-4916-AD29-99D65A4614B2}">
+  <ds:schemaRefs/>
+</ds:datastoreItem>
+</file>
+
+<file path=customXml/itemProps11.xml><?xml version="1.0" encoding="utf-8"?>
 <ds:datastoreItem xmlns:ds="http://schemas.openxmlformats.org/officeDocument/2006/customXml" ds:itemID="{7D7B921B-8E0C-4F2F-AB74-037A0339DFFA}">
   <ds:schemaRefs/>
 </ds:datastoreItem>
 </file>
 
-<file path=customXml/itemProps11.xml><?xml version="1.0" encoding="utf-8"?>
-<ds:datastoreItem xmlns:ds="http://schemas.openxmlformats.org/officeDocument/2006/customXml" ds:itemID="{CE5C4FF1-B320-4954-A1AF-EE52FB8658BE}">
-  <ds:schemaRefs/>
-</ds:datastoreItem>
-</file>
-
 <file path=customXml/itemProps12.xml><?xml version="1.0" encoding="utf-8"?>
-<ds:datastoreItem xmlns:ds="http://schemas.openxmlformats.org/officeDocument/2006/customXml" ds:itemID="{31B8BA4C-0408-476B-BA13-072F4C740F6C}">
+<ds:datastoreItem xmlns:ds="http://schemas.openxmlformats.org/officeDocument/2006/customXml" ds:itemID="{9117BA10-B137-4884-BAD1-8347BA164335}">
   <ds:schemaRefs/>
 </ds:datastoreItem>
 </file>
 
 <file path=customXml/itemProps13.xml><?xml version="1.0" encoding="utf-8"?>
-<ds:datastoreItem xmlns:ds="http://schemas.openxmlformats.org/officeDocument/2006/customXml" ds:itemID="{588C20F5-313A-4376-81C3-2D721DD4DD0F}">
+<ds:datastoreItem xmlns:ds="http://schemas.openxmlformats.org/officeDocument/2006/customXml" ds:itemID="{A8DB02A8-497C-4207-AEE9-392EB5B1936D}">
   <ds:schemaRefs/>
 </ds:datastoreItem>
 </file>
@@ -17968,61 +17833,61 @@
 </file>
 
 <file path=customXml/itemProps15.xml><?xml version="1.0" encoding="utf-8"?>
-<ds:datastoreItem xmlns:ds="http://schemas.openxmlformats.org/officeDocument/2006/customXml" ds:itemID="{E0C4D9C2-E20F-4916-AD29-99D65A4614B2}">
+<ds:datastoreItem xmlns:ds="http://schemas.openxmlformats.org/officeDocument/2006/customXml" ds:itemID="{A5AC6536-8698-4BD4-B045-FAC2CBEA886E}">
   <ds:schemaRefs/>
 </ds:datastoreItem>
 </file>
 
 <file path=customXml/itemProps16.xml><?xml version="1.0" encoding="utf-8"?>
+<ds:datastoreItem xmlns:ds="http://schemas.openxmlformats.org/officeDocument/2006/customXml" ds:itemID="{588C20F5-313A-4376-81C3-2D721DD4DD0F}">
+  <ds:schemaRefs/>
+</ds:datastoreItem>
+</file>
+
+<file path=customXml/itemProps2.xml><?xml version="1.0" encoding="utf-8"?>
+<ds:datastoreItem xmlns:ds="http://schemas.openxmlformats.org/officeDocument/2006/customXml" ds:itemID="{29A6839F-64E4-4D1C-A41F-5EB5AB2AE888}">
+  <ds:schemaRefs/>
+</ds:datastoreItem>
+</file>
+
+<file path=customXml/itemProps3.xml><?xml version="1.0" encoding="utf-8"?>
+<ds:datastoreItem xmlns:ds="http://schemas.openxmlformats.org/officeDocument/2006/customXml" ds:itemID="{31B8BA4C-0408-476B-BA13-072F4C740F6C}">
+  <ds:schemaRefs/>
+</ds:datastoreItem>
+</file>
+
+<file path=customXml/itemProps4.xml><?xml version="1.0" encoding="utf-8"?>
+<ds:datastoreItem xmlns:ds="http://schemas.openxmlformats.org/officeDocument/2006/customXml" ds:itemID="{25CE08FD-F7B6-4F54-8EBC-75735FE238C3}">
+  <ds:schemaRefs/>
+</ds:datastoreItem>
+</file>
+
+<file path=customXml/itemProps5.xml><?xml version="1.0" encoding="utf-8"?>
 <ds:datastoreItem xmlns:ds="http://schemas.openxmlformats.org/officeDocument/2006/customXml" ds:itemID="{63E9D574-2E31-4DA0-8ED5-E65D3AD4E5C7}">
   <ds:schemaRefs/>
 </ds:datastoreItem>
 </file>
 
-<file path=customXml/itemProps2.xml><?xml version="1.0" encoding="utf-8"?>
-<ds:datastoreItem xmlns:ds="http://schemas.openxmlformats.org/officeDocument/2006/customXml" ds:itemID="{25CE08FD-F7B6-4F54-8EBC-75735FE238C3}">
+<file path=customXml/itemProps6.xml><?xml version="1.0" encoding="utf-8"?>
+<ds:datastoreItem xmlns:ds="http://schemas.openxmlformats.org/officeDocument/2006/customXml" ds:itemID="{067CD289-AAE9-47C2-A22E-4A438035E00B}">
   <ds:schemaRefs/>
 </ds:datastoreItem>
 </file>
 
-<file path=customXml/itemProps3.xml><?xml version="1.0" encoding="utf-8"?>
-<ds:datastoreItem xmlns:ds="http://schemas.openxmlformats.org/officeDocument/2006/customXml" ds:itemID="{842D172F-72A1-4859-BC77-2CA436BA65BB}">
-  <ds:schemaRefs/>
-</ds:datastoreItem>
-</file>
-
-<file path=customXml/itemProps4.xml><?xml version="1.0" encoding="utf-8"?>
-<ds:datastoreItem xmlns:ds="http://schemas.openxmlformats.org/officeDocument/2006/customXml" ds:itemID="{9117BA10-B137-4884-BAD1-8347BA164335}">
-  <ds:schemaRefs/>
-</ds:datastoreItem>
-</file>
-
-<file path=customXml/itemProps5.xml><?xml version="1.0" encoding="utf-8"?>
-<ds:datastoreItem xmlns:ds="http://schemas.openxmlformats.org/officeDocument/2006/customXml" ds:itemID="{CC472C16-D918-4FD1-A8DC-961ED60C4BA4}">
-  <ds:schemaRefs/>
-</ds:datastoreItem>
-</file>
-
-<file path=customXml/itemProps6.xml><?xml version="1.0" encoding="utf-8"?>
+<file path=customXml/itemProps7.xml><?xml version="1.0" encoding="utf-8"?>
 <ds:datastoreItem xmlns:ds="http://schemas.openxmlformats.org/officeDocument/2006/customXml" ds:itemID="{03575653-F8BF-4601-9883-AE65C74334E5}">
   <ds:schemaRefs/>
 </ds:datastoreItem>
 </file>
 
-<file path=customXml/itemProps7.xml><?xml version="1.0" encoding="utf-8"?>
-<ds:datastoreItem xmlns:ds="http://schemas.openxmlformats.org/officeDocument/2006/customXml" ds:itemID="{29A6839F-64E4-4D1C-A41F-5EB5AB2AE888}">
-  <ds:schemaRefs/>
-</ds:datastoreItem>
-</file>
-
 <file path=customXml/itemProps8.xml><?xml version="1.0" encoding="utf-8"?>
-<ds:datastoreItem xmlns:ds="http://schemas.openxmlformats.org/officeDocument/2006/customXml" ds:itemID="{A5AC6536-8698-4BD4-B045-FAC2CBEA886E}">
+<ds:datastoreItem xmlns:ds="http://schemas.openxmlformats.org/officeDocument/2006/customXml" ds:itemID="{CE5C4FF1-B320-4954-A1AF-EE52FB8658BE}">
   <ds:schemaRefs/>
 </ds:datastoreItem>
 </file>
 
 <file path=customXml/itemProps9.xml><?xml version="1.0" encoding="utf-8"?>
-<ds:datastoreItem xmlns:ds="http://schemas.openxmlformats.org/officeDocument/2006/customXml" ds:itemID="{A8DB02A8-497C-4207-AEE9-392EB5B1936D}">
+<ds:datastoreItem xmlns:ds="http://schemas.openxmlformats.org/officeDocument/2006/customXml" ds:itemID="{CC472C16-D918-4FD1-A8DC-961ED60C4BA4}">
   <ds:schemaRefs/>
 </ds:datastoreItem>
 </file>
</xml_diff>